<commit_message>
setting up system level prognostics experiment
</commit_message>
<xml_diff>
--- a/pdfs/poster.pptx
+++ b/pdfs/poster.pptx
@@ -335,7 +335,7 @@
               <a:pPr>
                 <a:defRPr/>
               </a:pPr>
-              <a:t>10/16/2019</a:t>
+              <a:t>10/25/2019</a:t>
             </a:fld>
             <a:endParaRPr lang="en-US" altLang="en-US"/>
           </a:p>
@@ -548,7 +548,7 @@
               <a:pPr>
                 <a:defRPr/>
               </a:pPr>
-              <a:t>10/16/2019</a:t>
+              <a:t>10/25/2019</a:t>
             </a:fld>
             <a:endParaRPr lang="en-US" altLang="en-US"/>
           </a:p>
@@ -771,7 +771,7 @@
               <a:pPr>
                 <a:defRPr/>
               </a:pPr>
-              <a:t>10/16/2019</a:t>
+              <a:t>10/25/2019</a:t>
             </a:fld>
             <a:endParaRPr lang="en-US" altLang="en-US"/>
           </a:p>
@@ -984,7 +984,7 @@
               <a:pPr>
                 <a:defRPr/>
               </a:pPr>
-              <a:t>10/16/2019</a:t>
+              <a:t>10/25/2019</a:t>
             </a:fld>
             <a:endParaRPr lang="en-US" altLang="en-US"/>
           </a:p>
@@ -1272,7 +1272,7 @@
               <a:pPr>
                 <a:defRPr/>
               </a:pPr>
-              <a:t>10/16/2019</a:t>
+              <a:t>10/25/2019</a:t>
             </a:fld>
             <a:endParaRPr lang="en-US" altLang="en-US"/>
           </a:p>
@@ -1578,7 +1578,7 @@
               <a:pPr>
                 <a:defRPr/>
               </a:pPr>
-              <a:t>10/16/2019</a:t>
+              <a:t>10/25/2019</a:t>
             </a:fld>
             <a:endParaRPr lang="en-US" altLang="en-US"/>
           </a:p>
@@ -1999,7 +1999,7 @@
               <a:pPr>
                 <a:defRPr/>
               </a:pPr>
-              <a:t>10/16/2019</a:t>
+              <a:t>10/25/2019</a:t>
             </a:fld>
             <a:endParaRPr lang="en-US" altLang="en-US"/>
           </a:p>
@@ -2161,7 +2161,7 @@
               <a:pPr>
                 <a:defRPr/>
               </a:pPr>
-              <a:t>10/16/2019</a:t>
+              <a:t>10/25/2019</a:t>
             </a:fld>
             <a:endParaRPr lang="en-US" altLang="en-US"/>
           </a:p>
@@ -2301,7 +2301,7 @@
               <a:pPr>
                 <a:defRPr/>
               </a:pPr>
-              <a:t>10/16/2019</a:t>
+              <a:t>10/25/2019</a:t>
             </a:fld>
             <a:endParaRPr lang="en-US" altLang="en-US"/>
           </a:p>
@@ -2606,7 +2606,7 @@
               <a:pPr>
                 <a:defRPr/>
               </a:pPr>
-              <a:t>10/16/2019</a:t>
+              <a:t>10/25/2019</a:t>
             </a:fld>
             <a:endParaRPr lang="en-US" altLang="en-US"/>
           </a:p>
@@ -2907,7 +2907,7 @@
               <a:pPr>
                 <a:defRPr/>
               </a:pPr>
-              <a:t>10/16/2019</a:t>
+              <a:t>10/25/2019</a:t>
             </a:fld>
             <a:endParaRPr lang="en-US" altLang="en-US"/>
           </a:p>
@@ -3214,7 +3214,7 @@
               <a:pPr>
                 <a:defRPr/>
               </a:pPr>
-              <a:t>10/16/2019</a:t>
+              <a:t>10/25/2019</a:t>
             </a:fld>
             <a:endParaRPr lang="en-US" altLang="en-US"/>
           </a:p>
@@ -10238,16 +10238,13 @@
                       <a:schemeClr val="tx1"/>
                     </a:solidFill>
                   </a:rPr>
-                  <a:t>Performance </a:t>
+                  <a:t>System State Update</a:t>
                 </a:r>
-                <a:r>
-                  <a:rPr lang="en-US" sz="1900" b="1" dirty="0">
-                    <a:solidFill>
-                      <a:schemeClr val="tx1"/>
-                    </a:solidFill>
-                  </a:rPr>
-                  <a:t>Evaluation</a:t>
-                </a:r>
+                <a:endParaRPr lang="en-US" sz="1900" b="1" dirty="0">
+                  <a:solidFill>
+                    <a:schemeClr val="tx1"/>
+                  </a:solidFill>
+                </a:endParaRPr>
               </a:p>
             </p:txBody>
           </p:sp>
@@ -10618,7 +10615,7 @@
           </p:nvSpPr>
           <p:spPr>
             <a:xfrm>
-              <a:off x="32004000" y="13792200"/>
+              <a:off x="32004000" y="13820001"/>
               <a:ext cx="1295400" cy="276999"/>
             </a:xfrm>
             <a:prstGeom prst="rect">
@@ -10660,8 +10657,8 @@
             <p:nvPr/>
           </p:nvCxnSpPr>
           <p:spPr>
-            <a:xfrm flipV="1">
-              <a:off x="32613600" y="11811000"/>
+            <a:xfrm flipH="1" flipV="1">
+              <a:off x="34137600" y="11811000"/>
               <a:ext cx="914400" cy="609600"/>
             </a:xfrm>
             <a:prstGeom prst="bentConnector3">
@@ -10703,7 +10700,7 @@
           </p:nvSpPr>
           <p:spPr>
             <a:xfrm>
-              <a:off x="33070800" y="11506200"/>
+              <a:off x="33528000" y="11499502"/>
               <a:ext cx="1295400" cy="461665"/>
             </a:xfrm>
             <a:prstGeom prst="rect">
@@ -10744,7 +10741,7 @@
                     </a:schemeClr>
                   </a:solidFill>
                 </a:rPr>
-                <a:t>         criteria</a:t>
+                <a:t>criteria</a:t>
               </a:r>
             </a:p>
           </p:txBody>

</xml_diff>